<commit_message>
Added examples and fixed formatting
</commit_message>
<xml_diff>
--- a/Recommendations_for_data-processing_systems.pptx
+++ b/Recommendations_for_data-processing_systems.pptx
@@ -15,9 +15,14 @@
     <p:sldId id="261" r:id="rId9"/>
     <p:sldId id="264" r:id="rId10"/>
     <p:sldId id="266" r:id="rId11"/>
-    <p:sldId id="265" r:id="rId12"/>
-    <p:sldId id="267" r:id="rId13"/>
-    <p:sldId id="268" r:id="rId14"/>
+    <p:sldId id="269" r:id="rId12"/>
+    <p:sldId id="265" r:id="rId13"/>
+    <p:sldId id="270" r:id="rId14"/>
+    <p:sldId id="267" r:id="rId15"/>
+    <p:sldId id="271" r:id="rId16"/>
+    <p:sldId id="272" r:id="rId17"/>
+    <p:sldId id="273" r:id="rId18"/>
+    <p:sldId id="268" r:id="rId19"/>
   </p:sldIdLst>
   <p:sldSz cx="12192000" cy="6858000"/>
   <p:notesSz cx="6858000" cy="9144000"/>
@@ -116,6 +121,11 @@
       </a:defRPr>
     </a:lvl9pPr>
   </p:defaultTextStyle>
+  <p:extLst>
+    <p:ext uri="{EFAFB233-063F-42B5-8137-9DF3F51BA10A}">
+      <p15:sldGuideLst xmlns:p15="http://schemas.microsoft.com/office/powerpoint/2012/main"/>
+    </p:ext>
+  </p:extLst>
 </p:presentation>
 </file>
 
@@ -214,7 +224,7 @@
           <a:effectLst/>
           <a:extLst>
             <a:ext uri="{91240B29-F687-4f45-9708-019B960494DF}">
-              <a14:hiddenLine xmlns:a14="http://schemas.microsoft.com/office/drawing/2010/main" xmlns="" w="9525">
+              <a14:hiddenLine xmlns="" xmlns:a14="http://schemas.microsoft.com/office/drawing/2010/main" w="9525">
                 <a:solidFill>
                   <a:srgbClr val="000000"/>
                 </a:solidFill>
@@ -407,7 +417,7 @@
             <a:fld id="{08B9EBBA-996F-894A-B54A-D6246ED52CEA}" type="datetimeFigureOut">
               <a:rPr lang="en-US" dirty="0"/>
               <a:pPr/>
-              <a:t>1/30/2018</a:t>
+              <a:t>2/22/2018</a:t>
             </a:fld>
             <a:endParaRPr lang="en-US" dirty="0"/>
           </a:p>
@@ -722,7 +732,7 @@
             <a:fld id="{18C79C5D-2A6F-F04D-97DA-BEF2467B64E4}" type="datetimeFigureOut">
               <a:rPr lang="en-US" dirty="0"/>
               <a:pPr/>
-              <a:t>1/30/2018</a:t>
+              <a:t>2/22/2018</a:t>
             </a:fld>
             <a:endParaRPr lang="en-US" dirty="0"/>
           </a:p>
@@ -1207,7 +1217,7 @@
             <a:fld id="{8DFA1846-DA80-1C48-A609-854EA85C59AD}" type="datetimeFigureOut">
               <a:rPr lang="en-US" dirty="0"/>
               <a:pPr/>
-              <a:t>1/30/2018</a:t>
+              <a:t>2/22/2018</a:t>
             </a:fld>
             <a:endParaRPr lang="en-US" dirty="0"/>
           </a:p>
@@ -1573,7 +1583,7 @@
             <a:fld id="{FBF54567-0DE4-3F47-BF90-CB84690072F9}" type="datetimeFigureOut">
               <a:rPr lang="en-US" dirty="0"/>
               <a:pPr/>
-              <a:t>1/30/2018</a:t>
+              <a:t>2/22/2018</a:t>
             </a:fld>
             <a:endParaRPr lang="en-US" dirty="0"/>
           </a:p>
@@ -1724,7 +1734,7 @@
           <a:ln/>
           <a:extLst>
             <a:ext uri="{91240B29-F687-4f45-9708-019B960494DF}">
-              <a14:hiddenLine xmlns:a14="http://schemas.microsoft.com/office/drawing/2010/main" xmlns="" w="9525">
+              <a14:hiddenLine xmlns="" xmlns:a14="http://schemas.microsoft.com/office/drawing/2010/main" w="9525">
                 <a:solidFill>
                   <a:srgbClr val="000000"/>
                 </a:solidFill>
@@ -1843,7 +1853,7 @@
             <a:fld id="{C6C52C72-DE31-F449-A4ED-4C594FD91407}" type="datetimeFigureOut">
               <a:rPr lang="en-US" dirty="0"/>
               <a:pPr/>
-              <a:t>1/30/2018</a:t>
+              <a:t>2/22/2018</a:t>
             </a:fld>
             <a:endParaRPr lang="en-US" dirty="0"/>
           </a:p>
@@ -1996,7 +2006,7 @@
           <a:ln/>
           <a:extLst>
             <a:ext uri="{91240B29-F687-4f45-9708-019B960494DF}">
-              <a14:hiddenLine xmlns:a14="http://schemas.microsoft.com/office/drawing/2010/main" xmlns="" w="9525">
+              <a14:hiddenLine xmlns="" xmlns:a14="http://schemas.microsoft.com/office/drawing/2010/main" w="9525">
                 <a:solidFill>
                   <a:srgbClr val="000000"/>
                 </a:solidFill>
@@ -2125,7 +2135,7 @@
             <a:fld id="{ED62726E-379B-B349-9EED-81ED093FA806}" type="datetimeFigureOut">
               <a:rPr lang="en-US" dirty="0"/>
               <a:pPr/>
-              <a:t>1/30/2018</a:t>
+              <a:t>2/22/2018</a:t>
             </a:fld>
             <a:endParaRPr lang="en-US" dirty="0"/>
           </a:p>
@@ -2276,7 +2286,7 @@
           <a:ln/>
           <a:extLst>
             <a:ext uri="{91240B29-F687-4f45-9708-019B960494DF}">
-              <a14:hiddenLine xmlns:a14="http://schemas.microsoft.com/office/drawing/2010/main" xmlns="" w="9525">
+              <a14:hiddenLine xmlns="" xmlns:a14="http://schemas.microsoft.com/office/drawing/2010/main" w="9525">
                 <a:solidFill>
                   <a:srgbClr val="000000"/>
                 </a:solidFill>
@@ -2405,7 +2415,7 @@
             <a:fld id="{9B3A1323-8D79-1946-B0D7-40001CF92E9D}" type="datetimeFigureOut">
               <a:rPr lang="en-US" dirty="0"/>
               <a:pPr/>
-              <a:t>1/30/2018</a:t>
+              <a:t>2/22/2018</a:t>
             </a:fld>
             <a:endParaRPr lang="en-US" dirty="0"/>
           </a:p>
@@ -2745,7 +2755,7 @@
             <a:fld id="{8DFA1846-DA80-1C48-A609-854EA85C59AD}" type="datetimeFigureOut">
               <a:rPr lang="en-US" dirty="0"/>
               <a:pPr/>
-              <a:t>1/30/2018</a:t>
+              <a:t>2/22/2018</a:t>
             </a:fld>
             <a:endParaRPr lang="en-US" dirty="0"/>
           </a:p>
@@ -2896,7 +2906,7 @@
           <a:ln/>
           <a:extLst>
             <a:ext uri="{91240B29-F687-4f45-9708-019B960494DF}">
-              <a14:hiddenLine xmlns:a14="http://schemas.microsoft.com/office/drawing/2010/main" xmlns="" w="9525">
+              <a14:hiddenLine xmlns="" xmlns:a14="http://schemas.microsoft.com/office/drawing/2010/main" w="9525">
                 <a:solidFill>
                   <a:srgbClr val="000000"/>
                 </a:solidFill>
@@ -3081,7 +3091,7 @@
             <a:fld id="{57302355-E14B-8545-A8F8-0FE83CC9D524}" type="datetimeFigureOut">
               <a:rPr lang="en-US" dirty="0"/>
               <a:pPr/>
-              <a:t>1/30/2018</a:t>
+              <a:t>2/22/2018</a:t>
             </a:fld>
             <a:endParaRPr lang="en-US" dirty="0"/>
           </a:p>
@@ -3232,7 +3242,7 @@
           <a:ln/>
           <a:extLst>
             <a:ext uri="{91240B29-F687-4f45-9708-019B960494DF}">
-              <a14:hiddenLine xmlns:a14="http://schemas.microsoft.com/office/drawing/2010/main" xmlns="" w="9525">
+              <a14:hiddenLine xmlns="" xmlns:a14="http://schemas.microsoft.com/office/drawing/2010/main" w="9525">
                 <a:solidFill>
                   <a:srgbClr val="000000"/>
                 </a:solidFill>
@@ -3555,7 +3565,7 @@
             <a:fld id="{02640F58-564D-2B4F-AE67-E407BA4FCF45}" type="datetimeFigureOut">
               <a:rPr lang="en-US" dirty="0"/>
               <a:pPr/>
-              <a:t>1/30/2018</a:t>
+              <a:t>2/22/2018</a:t>
             </a:fld>
             <a:endParaRPr lang="en-US" dirty="0"/>
           </a:p>
@@ -3706,7 +3716,7 @@
           <a:ln/>
           <a:extLst>
             <a:ext uri="{91240B29-F687-4f45-9708-019B960494DF}">
-              <a14:hiddenLine xmlns:a14="http://schemas.microsoft.com/office/drawing/2010/main" xmlns="" w="9525">
+              <a14:hiddenLine xmlns="" xmlns:a14="http://schemas.microsoft.com/office/drawing/2010/main" w="9525">
                 <a:solidFill>
                   <a:srgbClr val="000000"/>
                 </a:solidFill>
@@ -3773,7 +3783,7 @@
             <a:fld id="{F13A34C8-038E-2045-AF43-DF7DBB8E0E9E}" type="datetimeFigureOut">
               <a:rPr lang="en-US" dirty="0"/>
               <a:pPr/>
-              <a:t>1/30/2018</a:t>
+              <a:t>2/22/2018</a:t>
             </a:fld>
             <a:endParaRPr lang="en-US" dirty="0"/>
           </a:p>
@@ -3865,7 +3875,7 @@
             <a:fld id="{8818C68F-D26B-8F47-958C-23B49CF8A634}" type="datetimeFigureOut">
               <a:rPr lang="en-US" dirty="0"/>
               <a:pPr/>
-              <a:t>1/30/2018</a:t>
+              <a:t>2/22/2018</a:t>
             </a:fld>
             <a:endParaRPr lang="en-US" dirty="0"/>
           </a:p>
@@ -4129,7 +4139,7 @@
           <a:ln/>
           <a:extLst>
             <a:ext uri="{91240B29-F687-4f45-9708-019B960494DF}">
-              <a14:hiddenLine xmlns:a14="http://schemas.microsoft.com/office/drawing/2010/main" xmlns="" w="9525">
+              <a14:hiddenLine xmlns="" xmlns:a14="http://schemas.microsoft.com/office/drawing/2010/main" w="9525">
                 <a:solidFill>
                   <a:srgbClr val="000000"/>
                 </a:solidFill>
@@ -4329,7 +4339,7 @@
             <a:fld id="{D0DF5E60-9974-AC48-9591-99C2BB44B7CF}" type="datetimeFigureOut">
               <a:rPr lang="en-US" dirty="0"/>
               <a:pPr/>
-              <a:t>1/30/2018</a:t>
+              <a:t>2/22/2018</a:t>
             </a:fld>
             <a:endParaRPr lang="en-US" dirty="0"/>
           </a:p>
@@ -4639,7 +4649,7 @@
             <a:fld id="{18C79C5D-2A6F-F04D-97DA-BEF2467B64E4}" type="datetimeFigureOut">
               <a:rPr lang="en-US" dirty="0"/>
               <a:pPr/>
-              <a:t>1/30/2018</a:t>
+              <a:t>2/22/2018</a:t>
             </a:fld>
             <a:endParaRPr lang="en-US" dirty="0"/>
           </a:p>
@@ -4906,7 +4916,7 @@
             <a:fld id="{09B482E8-6E0E-1B4F-B1FD-C69DB9E858D9}" type="datetimeFigureOut">
               <a:rPr lang="en-US" dirty="0"/>
               <a:pPr/>
-              <a:t>1/30/2018</a:t>
+              <a:t>2/22/2018</a:t>
             </a:fld>
             <a:endParaRPr lang="en-US" dirty="0"/>
           </a:p>
@@ -5396,14 +5406,27 @@
             <p:ph type="subTitle" idx="1"/>
           </p:nvPr>
         </p:nvSpPr>
-        <p:spPr/>
-        <p:txBody>
-          <a:bodyPr/>
-          <a:lstStyle/>
-          <a:p>
-            <a:r>
-              <a:rPr lang="en-US" dirty="0"/>
+        <p:spPr>
+          <a:xfrm>
+            <a:off x="810001" y="5280846"/>
+            <a:ext cx="10572000" cy="1265727"/>
+          </a:xfrm>
+        </p:spPr>
+        <p:txBody>
+          <a:bodyPr>
+            <a:noAutofit/>
+          </a:bodyPr>
+          <a:lstStyle/>
+          <a:p>
+            <a:r>
+              <a:rPr lang="en-US" sz="2400" dirty="0"/>
               <a:t>Brian Wehrle</a:t>
+            </a:r>
+          </a:p>
+          <a:p>
+            <a:r>
+              <a:rPr lang="en-US" sz="2400" dirty="0"/>
+              <a:t>Software architect</a:t>
             </a:r>
           </a:p>
         </p:txBody>
@@ -5482,47 +5505,54 @@
             <p:ph idx="1"/>
           </p:nvPr>
         </p:nvSpPr>
-        <p:spPr/>
-        <p:txBody>
-          <a:bodyPr/>
-          <a:lstStyle/>
-          <a:p>
-            <a:r>
-              <a:rPr lang="en-US" dirty="0"/>
+        <p:spPr>
+          <a:xfrm>
+            <a:off x="818712" y="2222287"/>
+            <a:ext cx="10554574" cy="4188525"/>
+          </a:xfrm>
+        </p:spPr>
+        <p:txBody>
+          <a:bodyPr>
+            <a:normAutofit/>
+          </a:bodyPr>
+          <a:lstStyle/>
+          <a:p>
+            <a:r>
+              <a:rPr lang="en-US" sz="2000" dirty="0"/>
               <a:t>Keep the different versions of your data available for change analysis and testing</a:t>
             </a:r>
           </a:p>
           <a:p>
             <a:pPr lvl="1"/>
             <a:r>
-              <a:rPr lang="en-US" dirty="0"/>
+              <a:rPr lang="en-US" sz="2000" dirty="0"/>
               <a:t>Using the same source data your new data processing solution should produce outputs that can be easily compared to last build, etc.</a:t>
             </a:r>
           </a:p>
           <a:p>
             <a:pPr lvl="1"/>
             <a:r>
-              <a:rPr lang="en-US" dirty="0"/>
+              <a:rPr lang="en-US" sz="2000" dirty="0"/>
               <a:t>Separating data into different folders/buckets/partitions by version lets you run new versions side by side and compare results</a:t>
             </a:r>
           </a:p>
           <a:p>
             <a:r>
-              <a:rPr lang="en-US" dirty="0"/>
+              <a:rPr lang="en-US" sz="2000" dirty="0"/>
               <a:t>Throwing away data can be useful if its too expensive, otherwise keep it around</a:t>
             </a:r>
           </a:p>
           <a:p>
             <a:pPr lvl="1"/>
             <a:r>
-              <a:rPr lang="en-US" dirty="0"/>
+              <a:rPr lang="en-US" sz="2000" dirty="0"/>
               <a:t>Many systems integrate with low-cost long-term storage systems with very low costs</a:t>
             </a:r>
           </a:p>
           <a:p>
             <a:pPr lvl="1"/>
             <a:r>
-              <a:rPr lang="en-US" dirty="0"/>
+              <a:rPr lang="en-US" sz="2000" dirty="0"/>
               <a:t>Max prices: AWS S3 1TB / month -&gt; 20$, AWS Glacier 1TB -&gt; 4$ </a:t>
             </a:r>
           </a:p>
@@ -5581,7 +5611,7 @@
           <a:p>
             <a:r>
               <a:rPr lang="en-US" dirty="0"/>
-              <a:t>Data processing: Think meta-data</a:t>
+              <a:t>Data processing: Keep all the data you can afford example</a:t>
             </a:r>
           </a:p>
         </p:txBody>
@@ -5602,91 +5632,63 @@
             <p:ph idx="1"/>
           </p:nvPr>
         </p:nvSpPr>
-        <p:spPr/>
+        <p:spPr>
+          <a:xfrm>
+            <a:off x="818712" y="2222287"/>
+            <a:ext cx="10554574" cy="4188525"/>
+          </a:xfrm>
+        </p:spPr>
         <p:txBody>
           <a:bodyPr>
-            <a:normAutofit fontScale="85000" lnSpcReduction="20000"/>
+            <a:noAutofit/>
           </a:bodyPr>
           <a:lstStyle/>
           <a:p>
             <a:r>
-              <a:rPr lang="en-US" dirty="0"/>
-              <a:t>Put plenty of meta-data into your streaming:</a:t>
+              <a:rPr lang="en-US" sz="2000" dirty="0"/>
+              <a:t>Basket example:</a:t>
             </a:r>
           </a:p>
           <a:p>
             <a:pPr lvl="1"/>
             <a:r>
-              <a:rPr lang="en-US" dirty="0"/>
-              <a:t>Processing time stamps (start/stop processing stamps if pipeline is complex)</a:t>
+              <a:rPr lang="en-US" sz="2000" dirty="0"/>
+              <a:t>Your data scientists have basket features  (variables) for data science, and these change over time</a:t>
             </a:r>
           </a:p>
           <a:p>
             <a:pPr lvl="1"/>
             <a:r>
-              <a:rPr lang="en-US" dirty="0"/>
-              <a:t>Origin of data (server, locale)</a:t>
+              <a:rPr lang="en-US" sz="2000" dirty="0"/>
+              <a:t>They will want to reprocess historical data to train and validate models and</a:t>
             </a:r>
           </a:p>
           <a:p>
             <a:pPr lvl="1"/>
             <a:r>
-              <a:rPr lang="en-US" dirty="0"/>
-              <a:t>Version of code base that processed the data</a:t>
+              <a:rPr lang="en-US" sz="2000" dirty="0"/>
+              <a:t>Keeping the different versions of this data allows for folks to quickly test out or compare different versions of a model</a:t>
             </a:r>
           </a:p>
           <a:p>
             <a:pPr lvl="1"/>
             <a:r>
-              <a:rPr lang="en-US" dirty="0"/>
-              <a:t>Source event related to output event (trigger capture or traceability)</a:t>
-            </a:r>
-          </a:p>
-          <a:p>
-            <a:r>
-              <a:rPr lang="en-US" dirty="0"/>
-              <a:t>You can now do post-facto analysis on:</a:t>
+              <a:rPr lang="en-US" sz="2000" dirty="0"/>
+              <a:t>After a while though, no one will care about the variables from 3 years ago</a:t>
             </a:r>
           </a:p>
           <a:p>
             <a:pPr lvl="1"/>
             <a:r>
-              <a:rPr lang="en-US" dirty="0"/>
-              <a:t>Change in data between versions (statistically)</a:t>
+              <a:rPr lang="en-US" sz="2000" dirty="0"/>
+              <a:t>Infrastructure automation puts this type of data into cheaper storage tiers or remove it directly after a certain age.</a:t>
             </a:r>
           </a:p>
           <a:p>
             <a:pPr lvl="1"/>
             <a:r>
-              <a:rPr lang="en-US" dirty="0"/>
-              <a:t>Data provenance</a:t>
-            </a:r>
-          </a:p>
-          <a:p>
-            <a:pPr lvl="1"/>
-            <a:r>
-              <a:rPr lang="en-US" dirty="0"/>
-              <a:t>System processing performance </a:t>
-            </a:r>
-          </a:p>
-          <a:p>
-            <a:r>
-              <a:rPr lang="en-US" dirty="0"/>
-              <a:t>This will help greatly when:</a:t>
-            </a:r>
-          </a:p>
-          <a:p>
-            <a:pPr lvl="1"/>
-            <a:r>
-              <a:rPr lang="en-US" dirty="0"/>
-              <a:t>Debugging problems</a:t>
-            </a:r>
-          </a:p>
-          <a:p>
-            <a:pPr lvl="1"/>
-            <a:r>
-              <a:rPr lang="en-US" dirty="0"/>
-              <a:t>Validating new versions of the data processing software</a:t>
+              <a:rPr lang="en-US" sz="2000" dirty="0"/>
+              <a:t>However, you never throw away the source basket data</a:t>
             </a:r>
           </a:p>
         </p:txBody>
@@ -5694,7 +5696,7 @@
     </p:spTree>
     <p:extLst>
       <p:ext uri="{BB962C8B-B14F-4D97-AF65-F5344CB8AC3E}">
-        <p14:creationId xmlns:p14="http://schemas.microsoft.com/office/powerpoint/2010/main" val="1095446678"/>
+        <p14:creationId xmlns:p14="http://schemas.microsoft.com/office/powerpoint/2010/main" val="1259934017"/>
       </p:ext>
     </p:extLst>
   </p:cSld>
@@ -5744,7 +5746,7 @@
           <a:p>
             <a:r>
               <a:rPr lang="en-US" dirty="0"/>
-              <a:t>Data processing: Look beyond the monolith</a:t>
+              <a:t>Data processing: Think meta-data</a:t>
             </a:r>
           </a:p>
         </p:txBody>
@@ -5768,107 +5770,87 @@
         <p:spPr>
           <a:xfrm>
             <a:off x="818712" y="2222287"/>
-            <a:ext cx="10554574" cy="4403800"/>
+            <a:ext cx="10554574" cy="4188525"/>
           </a:xfrm>
         </p:spPr>
         <p:txBody>
           <a:bodyPr>
-            <a:normAutofit fontScale="92500"/>
+            <a:normAutofit/>
           </a:bodyPr>
           <a:lstStyle/>
           <a:p>
             <a:r>
               <a:rPr lang="en-US" dirty="0"/>
-              <a:t>Data processing systems lend themselves easily to the monolith pattern</a:t>
+              <a:t>Once your comfortable with having different versions of the data, you’ll realize that this can get confusing fast without some kind of additional data</a:t>
+            </a:r>
+          </a:p>
+          <a:p>
+            <a:r>
+              <a:rPr lang="en-US" dirty="0"/>
+              <a:t>Put plenty of meta-data into your streaming:</a:t>
             </a:r>
           </a:p>
           <a:p>
             <a:pPr lvl="1"/>
             <a:r>
               <a:rPr lang="en-US" dirty="0"/>
-              <a:t>You have to bring all of the data together to process it, hence it touches on many domains</a:t>
-            </a:r>
-          </a:p>
-          <a:p>
+              <a:t>Processing time stamps (start/stop processing stamps if pipeline is complex)</a:t>
+            </a:r>
+          </a:p>
+          <a:p>
+            <a:pPr lvl="1"/>
             <a:r>
               <a:rPr lang="en-US" dirty="0"/>
-              <a:t>Having a single system with multiple responsibilities will create problems as the size of the solutions / organization increases:</a:t>
+              <a:t>Origin of data (server, locale)</a:t>
             </a:r>
           </a:p>
           <a:p>
             <a:pPr lvl="1"/>
             <a:r>
               <a:rPr lang="en-US" dirty="0"/>
-              <a:t>Systems performance affecting unrelated processes</a:t>
+              <a:t>Version of code base that processed the data</a:t>
             </a:r>
           </a:p>
           <a:p>
             <a:pPr lvl="1"/>
             <a:r>
               <a:rPr lang="en-US" dirty="0"/>
-              <a:t>Change management / upgrades</a:t>
+              <a:t>Source event related to output event (for event producers)</a:t>
+            </a:r>
+          </a:p>
+          <a:p>
+            <a:r>
+              <a:rPr lang="en-US" dirty="0"/>
+              <a:t>You can now do post-facto analysis on:</a:t>
             </a:r>
           </a:p>
           <a:p>
             <a:pPr lvl="1"/>
             <a:r>
               <a:rPr lang="en-US" dirty="0"/>
-              <a:t>Ownership, management and cost attribution</a:t>
-            </a:r>
-          </a:p>
-          <a:p>
+              <a:t>Correctness in data between code processing versions (statistical validation)</a:t>
+            </a:r>
+          </a:p>
+          <a:p>
+            <a:pPr lvl="1"/>
             <a:r>
               <a:rPr lang="en-US" dirty="0"/>
-              <a:t>The era of containers makes this feasible and flexible:</a:t>
+              <a:t>Data provenance tracking</a:t>
             </a:r>
           </a:p>
           <a:p>
             <a:pPr lvl="1"/>
             <a:r>
               <a:rPr lang="en-US" dirty="0"/>
-              <a:t>Container solutions exist for all major data platforms</a:t>
-            </a:r>
-          </a:p>
-          <a:p>
-            <a:pPr lvl="1"/>
-            <a:r>
-              <a:rPr lang="en-US" dirty="0"/>
-              <a:t>Mature systems management (Mesos, </a:t>
-            </a:r>
-            <a:r>
-              <a:rPr lang="en-US" dirty="0" err="1"/>
-              <a:t>OpenShift</a:t>
-            </a:r>
-            <a:r>
-              <a:rPr lang="en-US" dirty="0"/>
-              <a:t>) allow small teams to manage resources effectively</a:t>
-            </a:r>
-          </a:p>
-          <a:p>
-            <a:r>
-              <a:rPr lang="en-US" dirty="0"/>
-              <a:t>Typical caveat:</a:t>
-            </a:r>
-          </a:p>
-          <a:p>
-            <a:pPr lvl="1"/>
-            <a:r>
-              <a:rPr lang="en-US" dirty="0"/>
-              <a:t>Monoliths can work well for small organizations</a:t>
-            </a:r>
-          </a:p>
-          <a:p>
-            <a:pPr marL="0" indent="0">
-              <a:buNone/>
-            </a:pPr>
-            <a:endParaRPr lang="en-US" dirty="0"/>
+              <a:t>Overall system performance  (from click to recommendation rendered on-screen)</a:t>
+            </a:r>
           </a:p>
         </p:txBody>
       </p:sp>
     </p:spTree>
     <p:extLst>
       <p:ext uri="{BB962C8B-B14F-4D97-AF65-F5344CB8AC3E}">
-        <p14:creationId xmlns:p14="http://schemas.microsoft.com/office/powerpoint/2010/main" val="1333807860"/>
+        <p14:creationId xmlns:p14="http://schemas.microsoft.com/office/powerpoint/2010/main" val="1095446678"/>
       </p:ext>
     </p:extLst>
   </p:cSld>
@@ -5911,14 +5893,19 @@
             <p:ph type="title"/>
           </p:nvPr>
         </p:nvSpPr>
-        <p:spPr/>
+        <p:spPr>
+          <a:xfrm>
+            <a:off x="818712" y="470306"/>
+            <a:ext cx="10571998" cy="970450"/>
+          </a:xfrm>
+        </p:spPr>
         <p:txBody>
           <a:bodyPr/>
           <a:lstStyle/>
           <a:p>
             <a:r>
               <a:rPr lang="en-US" dirty="0"/>
-              <a:t>Questions?</a:t>
+              <a:t>Data processing: Meta-data example for performance tracking</a:t>
             </a:r>
           </a:p>
         </p:txBody>
@@ -5941,20 +5928,928 @@
         </p:nvSpPr>
         <p:spPr>
           <a:xfrm>
+            <a:off x="818712" y="2209035"/>
+            <a:ext cx="10554574" cy="4188525"/>
+          </a:xfrm>
+        </p:spPr>
+        <p:txBody>
+          <a:bodyPr>
+            <a:normAutofit/>
+          </a:bodyPr>
+          <a:lstStyle/>
+          <a:p>
+            <a:r>
+              <a:rPr lang="en-US" sz="2000" dirty="0"/>
+              <a:t>Our clever data scientists have build a model that recommends upgrades to products once they’ve put an item into their cart (up-sell)</a:t>
+            </a:r>
+          </a:p>
+          <a:p>
+            <a:r>
+              <a:rPr lang="en-US" sz="2000" dirty="0"/>
+              <a:t>Recommendations are produced in “real-time” (&lt;1 sec) after the basket-item-added event</a:t>
+            </a:r>
+          </a:p>
+          <a:p>
+            <a:r>
+              <a:rPr lang="en-US" sz="2000" dirty="0"/>
+              <a:t>However, there is a multi-step pipeline here, and slowness would mean that the recommendation doesn’t get there in-time</a:t>
+            </a:r>
+          </a:p>
+          <a:p>
+            <a:r>
+              <a:rPr lang="en-US" sz="2000" dirty="0"/>
+              <a:t>We can add a “processing start” and “duration” field to our data for each stage of the pipeline</a:t>
+            </a:r>
+          </a:p>
+          <a:p>
+            <a:pPr lvl="1"/>
+            <a:r>
+              <a:rPr lang="en-US" sz="2000" dirty="0"/>
+              <a:t>This can be combined into the final recommendation result</a:t>
+            </a:r>
+          </a:p>
+          <a:p>
+            <a:pPr lvl="1"/>
+            <a:r>
+              <a:rPr lang="en-US" sz="2000" dirty="0"/>
+              <a:t>Later we can correlate system slowness to conversion rates, justify scaling out (or spending less and scaling back)</a:t>
+            </a:r>
+          </a:p>
+        </p:txBody>
+      </p:sp>
+    </p:spTree>
+    <p:extLst>
+      <p:ext uri="{BB962C8B-B14F-4D97-AF65-F5344CB8AC3E}">
+        <p14:creationId xmlns:p14="http://schemas.microsoft.com/office/powerpoint/2010/main" val="1880520940"/>
+      </p:ext>
+    </p:extLst>
+  </p:cSld>
+  <p:clrMapOvr>
+    <a:masterClrMapping/>
+  </p:clrMapOvr>
+</p:sld>
+</file>
+
+<file path=ppt/slides/slide14.xml><?xml version="1.0" encoding="utf-8"?>
+<p:sld xmlns:a="http://schemas.openxmlformats.org/drawingml/2006/main" xmlns:r="http://schemas.openxmlformats.org/officeDocument/2006/relationships" xmlns:p="http://schemas.openxmlformats.org/presentationml/2006/main">
+  <p:cSld>
+    <p:spTree>
+      <p:nvGrpSpPr>
+        <p:cNvPr id="1" name=""/>
+        <p:cNvGrpSpPr/>
+        <p:nvPr/>
+      </p:nvGrpSpPr>
+      <p:grpSpPr>
+        <a:xfrm>
+          <a:off x="0" y="0"/>
+          <a:ext cx="0" cy="0"/>
+          <a:chOff x="0" y="0"/>
+          <a:chExt cx="0" cy="0"/>
+        </a:xfrm>
+      </p:grpSpPr>
+      <p:sp>
+        <p:nvSpPr>
+          <p:cNvPr id="2" name="Title 1">
+            <a:extLst>
+              <a:ext uri="{FF2B5EF4-FFF2-40B4-BE49-F238E27FC236}">
+                <a16:creationId xmlns:a16="http://schemas.microsoft.com/office/drawing/2014/main" id="{0B8E87A0-5F87-4F9D-9483-22A88C6B58BC}"/>
+              </a:ext>
+            </a:extLst>
+          </p:cNvPr>
+          <p:cNvSpPr>
+            <a:spLocks noGrp="1"/>
+          </p:cNvSpPr>
+          <p:nvPr>
+            <p:ph type="title"/>
+          </p:nvPr>
+        </p:nvSpPr>
+        <p:spPr>
+          <a:xfrm>
+            <a:off x="810000" y="231913"/>
+            <a:ext cx="10571998" cy="1185725"/>
+          </a:xfrm>
+        </p:spPr>
+        <p:txBody>
+          <a:bodyPr/>
+          <a:lstStyle/>
+          <a:p>
+            <a:r>
+              <a:rPr lang="en-US" dirty="0"/>
+              <a:t>Data processing: Monolith growing pains</a:t>
+            </a:r>
+          </a:p>
+        </p:txBody>
+      </p:sp>
+      <p:sp>
+        <p:nvSpPr>
+          <p:cNvPr id="3" name="Content Placeholder 2">
+            <a:extLst>
+              <a:ext uri="{FF2B5EF4-FFF2-40B4-BE49-F238E27FC236}">
+                <a16:creationId xmlns:a16="http://schemas.microsoft.com/office/drawing/2014/main" id="{14AE5628-AFC6-4179-A60A-6E85420BCBD0}"/>
+              </a:ext>
+            </a:extLst>
+          </p:cNvPr>
+          <p:cNvSpPr>
+            <a:spLocks noGrp="1"/>
+          </p:cNvSpPr>
+          <p:nvPr>
+            <p:ph idx="1"/>
+          </p:nvPr>
+        </p:nvSpPr>
+        <p:spPr>
+          <a:xfrm>
             <a:off x="818712" y="2222287"/>
             <a:ext cx="10554574" cy="4403800"/>
           </a:xfrm>
         </p:spPr>
         <p:txBody>
           <a:bodyPr>
+            <a:noAutofit/>
+          </a:bodyPr>
+          <a:lstStyle/>
+          <a:p>
+            <a:r>
+              <a:rPr lang="en-US" dirty="0"/>
+              <a:t>Data processing systems lend themselves easily to the monolith pattern</a:t>
+            </a:r>
+          </a:p>
+          <a:p>
+            <a:pPr lvl="1"/>
+            <a:r>
+              <a:rPr lang="en-US" sz="1800" dirty="0"/>
+              <a:t>You have to bring all of the data together to process it, hence it touches on many domains</a:t>
+            </a:r>
+          </a:p>
+          <a:p>
+            <a:r>
+              <a:rPr lang="en-US" dirty="0"/>
+              <a:t>It’s recommended to start with a monolith if you don’t understand the system well, so its normal to end up with one after your first pass at building something</a:t>
+            </a:r>
+          </a:p>
+          <a:p>
+            <a:r>
+              <a:rPr lang="en-US" dirty="0"/>
+              <a:t>Having a single system with multiple responsibilities will create problems as the size of the solutions / organization increases:</a:t>
+            </a:r>
+          </a:p>
+          <a:p>
+            <a:pPr lvl="1"/>
+            <a:r>
+              <a:rPr lang="en-US" sz="1800" dirty="0"/>
+              <a:t>Performance of one process (high CPU/network) affecting other processes</a:t>
+            </a:r>
+          </a:p>
+          <a:p>
+            <a:pPr lvl="1"/>
+            <a:r>
+              <a:rPr lang="en-US" sz="1800" dirty="0"/>
+              <a:t>Ownership, management and cost attribution</a:t>
+            </a:r>
+          </a:p>
+          <a:p>
+            <a:pPr lvl="1"/>
+            <a:r>
+              <a:rPr lang="en-US" sz="1800" dirty="0"/>
+              <a:t>Upgrading underlying data processing framework (</a:t>
+            </a:r>
+            <a:r>
+              <a:rPr lang="en-US" sz="1800" dirty="0" err="1"/>
+              <a:t>Flink</a:t>
+            </a:r>
+            <a:r>
+              <a:rPr lang="en-US" sz="1800" dirty="0"/>
+              <a:t>/Spark/Trident)</a:t>
+            </a:r>
+          </a:p>
+          <a:p>
+            <a:r>
+              <a:rPr lang="en-US" dirty="0"/>
+              <a:t>Avoid using shared libraries and binary contracts</a:t>
+            </a:r>
+          </a:p>
+          <a:p>
+            <a:pPr lvl="1"/>
+            <a:r>
+              <a:rPr lang="en-US" sz="1800" dirty="0"/>
+              <a:t>AVRO and like can solve supporting changing data contracts</a:t>
+            </a:r>
+          </a:p>
+        </p:txBody>
+      </p:sp>
+    </p:spTree>
+    <p:extLst>
+      <p:ext uri="{BB962C8B-B14F-4D97-AF65-F5344CB8AC3E}">
+        <p14:creationId xmlns:p14="http://schemas.microsoft.com/office/powerpoint/2010/main" val="1333807860"/>
+      </p:ext>
+    </p:extLst>
+  </p:cSld>
+  <p:clrMapOvr>
+    <a:masterClrMapping/>
+  </p:clrMapOvr>
+</p:sld>
+</file>
+
+<file path=ppt/slides/slide15.xml><?xml version="1.0" encoding="utf-8"?>
+<p:sld xmlns:a="http://schemas.openxmlformats.org/drawingml/2006/main" xmlns:r="http://schemas.openxmlformats.org/officeDocument/2006/relationships" xmlns:p="http://schemas.openxmlformats.org/presentationml/2006/main">
+  <p:cSld>
+    <p:spTree>
+      <p:nvGrpSpPr>
+        <p:cNvPr id="1" name=""/>
+        <p:cNvGrpSpPr/>
+        <p:nvPr/>
+      </p:nvGrpSpPr>
+      <p:grpSpPr>
+        <a:xfrm>
+          <a:off x="0" y="0"/>
+          <a:ext cx="0" cy="0"/>
+          <a:chOff x="0" y="0"/>
+          <a:chExt cx="0" cy="0"/>
+        </a:xfrm>
+      </p:grpSpPr>
+      <p:sp>
+        <p:nvSpPr>
+          <p:cNvPr id="2" name="Title 1">
+            <a:extLst>
+              <a:ext uri="{FF2B5EF4-FFF2-40B4-BE49-F238E27FC236}">
+                <a16:creationId xmlns:a16="http://schemas.microsoft.com/office/drawing/2014/main" id="{0B8E87A0-5F87-4F9D-9483-22A88C6B58BC}"/>
+              </a:ext>
+            </a:extLst>
+          </p:cNvPr>
+          <p:cNvSpPr>
+            <a:spLocks noGrp="1"/>
+          </p:cNvSpPr>
+          <p:nvPr>
+            <p:ph type="title"/>
+          </p:nvPr>
+        </p:nvSpPr>
+        <p:spPr/>
+        <p:txBody>
+          <a:bodyPr/>
+          <a:lstStyle/>
+          <a:p>
+            <a:r>
+              <a:rPr lang="en-US" dirty="0"/>
+              <a:t>Data processing: Monolith example</a:t>
+            </a:r>
+          </a:p>
+        </p:txBody>
+      </p:sp>
+      <p:sp>
+        <p:nvSpPr>
+          <p:cNvPr id="3" name="Content Placeholder 2">
+            <a:extLst>
+              <a:ext uri="{FF2B5EF4-FFF2-40B4-BE49-F238E27FC236}">
+                <a16:creationId xmlns:a16="http://schemas.microsoft.com/office/drawing/2014/main" id="{14AE5628-AFC6-4179-A60A-6E85420BCBD0}"/>
+              </a:ext>
+            </a:extLst>
+          </p:cNvPr>
+          <p:cNvSpPr>
+            <a:spLocks noGrp="1"/>
+          </p:cNvSpPr>
+          <p:nvPr>
+            <p:ph idx="1"/>
+          </p:nvPr>
+        </p:nvSpPr>
+        <p:spPr>
+          <a:xfrm>
+            <a:off x="818712" y="2222287"/>
+            <a:ext cx="10554574" cy="4403800"/>
+          </a:xfrm>
+        </p:spPr>
+        <p:txBody>
+          <a:bodyPr>
+            <a:noAutofit/>
+          </a:bodyPr>
+          <a:lstStyle/>
+          <a:p>
+            <a:r>
+              <a:rPr lang="en-US" sz="2000" dirty="0"/>
+              <a:t>In our product recommendation system, we have lots of moving parts:</a:t>
+            </a:r>
+          </a:p>
+          <a:p>
+            <a:pPr lvl="1"/>
+            <a:r>
+              <a:rPr lang="en-US" sz="2000" dirty="0"/>
+              <a:t>Basket data source (Producer)</a:t>
+            </a:r>
+          </a:p>
+          <a:p>
+            <a:pPr lvl="1"/>
+            <a:r>
+              <a:rPr lang="en-US" sz="2000" dirty="0"/>
+              <a:t>Transformation</a:t>
+            </a:r>
+          </a:p>
+          <a:p>
+            <a:pPr lvl="1"/>
+            <a:r>
+              <a:rPr lang="en-US" sz="2000" dirty="0"/>
+              <a:t>Variable calculation / aggregation</a:t>
+            </a:r>
+          </a:p>
+          <a:p>
+            <a:pPr lvl="1"/>
+            <a:r>
+              <a:rPr lang="en-US" sz="2000" dirty="0"/>
+              <a:t>Model</a:t>
+            </a:r>
+          </a:p>
+          <a:p>
+            <a:pPr lvl="1"/>
+            <a:r>
+              <a:rPr lang="en-US" sz="2000" dirty="0"/>
+              <a:t>Recommendation producer (Recommendation service facade</a:t>
+            </a:r>
+            <a:r>
+              <a:rPr lang="ca-ES" sz="2000" dirty="0"/>
+              <a:t>)</a:t>
+            </a:r>
+            <a:endParaRPr lang="en-US" sz="2000" dirty="0"/>
+          </a:p>
+          <a:p>
+            <a:pPr lvl="1"/>
+            <a:r>
+              <a:rPr lang="en-US" sz="2000" dirty="0"/>
+              <a:t>Recommendation client (Embedded in the web/mobile application)</a:t>
+            </a:r>
+          </a:p>
+          <a:p>
+            <a:r>
+              <a:rPr lang="en-US" sz="2000" dirty="0"/>
+              <a:t>In a decoupled design, these end up being many different data processing systems</a:t>
+            </a:r>
+          </a:p>
+          <a:p>
+            <a:r>
+              <a:rPr lang="en-US" sz="2000" dirty="0"/>
+              <a:t>If we embed timestamp / duration date into the data in each stage, we’ll be able to analyze this later</a:t>
+            </a:r>
+          </a:p>
+        </p:txBody>
+      </p:sp>
+    </p:spTree>
+    <p:extLst>
+      <p:ext uri="{BB962C8B-B14F-4D97-AF65-F5344CB8AC3E}">
+        <p14:creationId xmlns:p14="http://schemas.microsoft.com/office/powerpoint/2010/main" val="4277293867"/>
+      </p:ext>
+    </p:extLst>
+  </p:cSld>
+  <p:clrMapOvr>
+    <a:masterClrMapping/>
+  </p:clrMapOvr>
+</p:sld>
+</file>
+
+<file path=ppt/slides/slide16.xml><?xml version="1.0" encoding="utf-8"?>
+<p:sld xmlns:a="http://schemas.openxmlformats.org/drawingml/2006/main" xmlns:r="http://schemas.openxmlformats.org/officeDocument/2006/relationships" xmlns:p="http://schemas.openxmlformats.org/presentationml/2006/main">
+  <p:cSld>
+    <p:spTree>
+      <p:nvGrpSpPr>
+        <p:cNvPr id="1" name=""/>
+        <p:cNvGrpSpPr/>
+        <p:nvPr/>
+      </p:nvGrpSpPr>
+      <p:grpSpPr>
+        <a:xfrm>
+          <a:off x="0" y="0"/>
+          <a:ext cx="0" cy="0"/>
+          <a:chOff x="0" y="0"/>
+          <a:chExt cx="0" cy="0"/>
+        </a:xfrm>
+      </p:grpSpPr>
+      <p:sp>
+        <p:nvSpPr>
+          <p:cNvPr id="2" name="Title 1">
+            <a:extLst>
+              <a:ext uri="{FF2B5EF4-FFF2-40B4-BE49-F238E27FC236}">
+                <a16:creationId xmlns:a16="http://schemas.microsoft.com/office/drawing/2014/main" id="{0B8E87A0-5F87-4F9D-9483-22A88C6B58BC}"/>
+              </a:ext>
+            </a:extLst>
+          </p:cNvPr>
+          <p:cNvSpPr>
+            <a:spLocks noGrp="1"/>
+          </p:cNvSpPr>
+          <p:nvPr>
+            <p:ph type="title"/>
+          </p:nvPr>
+        </p:nvSpPr>
+        <p:spPr/>
+        <p:txBody>
+          <a:bodyPr/>
+          <a:lstStyle/>
+          <a:p>
+            <a:r>
+              <a:rPr lang="en-US" dirty="0"/>
+              <a:t>Data processing: Monolith example</a:t>
+            </a:r>
+          </a:p>
+        </p:txBody>
+      </p:sp>
+      <p:pic>
+        <p:nvPicPr>
+          <p:cNvPr id="10" name="Picture 9">
+            <a:extLst>
+              <a:ext uri="{FF2B5EF4-FFF2-40B4-BE49-F238E27FC236}">
+                <a16:creationId xmlns:a16="http://schemas.microsoft.com/office/drawing/2014/main" id="{D7FC0784-1639-45C3-A3F0-C838F47E23E2}"/>
+              </a:ext>
+            </a:extLst>
+          </p:cNvPr>
+          <p:cNvPicPr>
+            <a:picLocks noChangeAspect="1"/>
+          </p:cNvPicPr>
+          <p:nvPr/>
+        </p:nvPicPr>
+        <p:blipFill>
+          <a:blip r:embed="rId2"/>
+          <a:stretch>
+            <a:fillRect/>
+          </a:stretch>
+        </p:blipFill>
+        <p:spPr>
+          <a:xfrm>
+            <a:off x="1710780" y="1909554"/>
+            <a:ext cx="8400629" cy="4766125"/>
+          </a:xfrm>
+          <a:prstGeom prst="rect">
+            <a:avLst/>
+          </a:prstGeom>
+        </p:spPr>
+      </p:pic>
+    </p:spTree>
+    <p:extLst>
+      <p:ext uri="{BB962C8B-B14F-4D97-AF65-F5344CB8AC3E}">
+        <p14:creationId xmlns:p14="http://schemas.microsoft.com/office/powerpoint/2010/main" val="1320466779"/>
+      </p:ext>
+    </p:extLst>
+  </p:cSld>
+  <p:clrMapOvr>
+    <a:masterClrMapping/>
+  </p:clrMapOvr>
+</p:sld>
+</file>
+
+<file path=ppt/slides/slide17.xml><?xml version="1.0" encoding="utf-8"?>
+<p:sld xmlns:a="http://schemas.openxmlformats.org/drawingml/2006/main" xmlns:r="http://schemas.openxmlformats.org/officeDocument/2006/relationships" xmlns:p="http://schemas.openxmlformats.org/presentationml/2006/main">
+  <p:cSld>
+    <p:spTree>
+      <p:nvGrpSpPr>
+        <p:cNvPr id="1" name=""/>
+        <p:cNvGrpSpPr/>
+        <p:nvPr/>
+      </p:nvGrpSpPr>
+      <p:grpSpPr>
+        <a:xfrm>
+          <a:off x="0" y="0"/>
+          <a:ext cx="0" cy="0"/>
+          <a:chOff x="0" y="0"/>
+          <a:chExt cx="0" cy="0"/>
+        </a:xfrm>
+      </p:grpSpPr>
+      <p:sp>
+        <p:nvSpPr>
+          <p:cNvPr id="2" name="Title 1">
+            <a:extLst>
+              <a:ext uri="{FF2B5EF4-FFF2-40B4-BE49-F238E27FC236}">
+                <a16:creationId xmlns:a16="http://schemas.microsoft.com/office/drawing/2014/main" id="{0B8E87A0-5F87-4F9D-9483-22A88C6B58BC}"/>
+              </a:ext>
+            </a:extLst>
+          </p:cNvPr>
+          <p:cNvSpPr>
+            <a:spLocks noGrp="1"/>
+          </p:cNvSpPr>
+          <p:nvPr>
+            <p:ph type="title"/>
+          </p:nvPr>
+        </p:nvSpPr>
+        <p:spPr/>
+        <p:txBody>
+          <a:bodyPr/>
+          <a:lstStyle/>
+          <a:p>
+            <a:r>
+              <a:rPr lang="en-US" dirty="0"/>
+              <a:t>Data processing: Monolith example</a:t>
+            </a:r>
+          </a:p>
+        </p:txBody>
+      </p:sp>
+      <p:sp>
+        <p:nvSpPr>
+          <p:cNvPr id="5" name="Content Placeholder 4">
+            <a:extLst>
+              <a:ext uri="{FF2B5EF4-FFF2-40B4-BE49-F238E27FC236}">
+                <a16:creationId xmlns:a16="http://schemas.microsoft.com/office/drawing/2014/main" id="{FD299812-DAB3-4A97-8980-72BF7EDD0739}"/>
+              </a:ext>
+            </a:extLst>
+          </p:cNvPr>
+          <p:cNvSpPr txBox="1">
+            <a:spLocks/>
+          </p:cNvSpPr>
+          <p:nvPr/>
+        </p:nvSpPr>
+        <p:spPr>
+          <a:xfrm>
+            <a:off x="810000" y="2489704"/>
+            <a:ext cx="10554574" cy="4043617"/>
+          </a:xfrm>
+          <a:prstGeom prst="rect">
+            <a:avLst/>
+          </a:prstGeom>
+          <a:effectLst>
+            <a:outerShdw blurRad="50800" dir="14400000">
+              <a:srgbClr val="000000">
+                <a:alpha val="40000"/>
+              </a:srgbClr>
+            </a:outerShdw>
+          </a:effectLst>
+        </p:spPr>
+        <p:txBody>
+          <a:bodyPr vert="horz" lIns="91440" tIns="45720" rIns="91440" bIns="45720" rtlCol="0" anchor="ctr">
+            <a:noAutofit/>
+          </a:bodyPr>
+          <a:lstStyle>
+            <a:lvl1pPr marL="342900" indent="-342900" algn="l" defTabSz="457200" rtl="0" eaLnBrk="1" latinLnBrk="0" hangingPunct="1">
+              <a:spcBef>
+                <a:spcPct val="20000"/>
+              </a:spcBef>
+              <a:spcAft>
+                <a:spcPts val="600"/>
+              </a:spcAft>
+              <a:buClr>
+                <a:schemeClr val="accent1"/>
+              </a:buClr>
+              <a:buFont typeface="Wingdings 2" charset="2"/>
+              <a:buChar char=""/>
+              <a:defRPr sz="1800" kern="1200">
+                <a:solidFill>
+                  <a:schemeClr val="tx1"/>
+                </a:solidFill>
+                <a:latin typeface="+mn-lt"/>
+                <a:ea typeface="+mn-ea"/>
+                <a:cs typeface="+mn-cs"/>
+              </a:defRPr>
+            </a:lvl1pPr>
+            <a:lvl2pPr marL="742950" indent="-285750" algn="l" defTabSz="457200" rtl="0" eaLnBrk="1" latinLnBrk="0" hangingPunct="1">
+              <a:spcBef>
+                <a:spcPct val="20000"/>
+              </a:spcBef>
+              <a:spcAft>
+                <a:spcPts val="600"/>
+              </a:spcAft>
+              <a:buClr>
+                <a:schemeClr val="accent1"/>
+              </a:buClr>
+              <a:buFont typeface="Wingdings 2" charset="2"/>
+              <a:buChar char=""/>
+              <a:defRPr sz="1600" kern="1200">
+                <a:solidFill>
+                  <a:schemeClr val="tx1"/>
+                </a:solidFill>
+                <a:latin typeface="+mn-lt"/>
+                <a:ea typeface="+mn-ea"/>
+                <a:cs typeface="+mn-cs"/>
+              </a:defRPr>
+            </a:lvl2pPr>
+            <a:lvl3pPr marL="1143000" indent="-228600" algn="l" defTabSz="457200" rtl="0" eaLnBrk="1" latinLnBrk="0" hangingPunct="1">
+              <a:spcBef>
+                <a:spcPct val="20000"/>
+              </a:spcBef>
+              <a:spcAft>
+                <a:spcPts val="600"/>
+              </a:spcAft>
+              <a:buClr>
+                <a:schemeClr val="accent1"/>
+              </a:buClr>
+              <a:buFont typeface="Wingdings 2" charset="2"/>
+              <a:buChar char=""/>
+              <a:defRPr sz="1400" kern="1200">
+                <a:solidFill>
+                  <a:schemeClr val="tx1"/>
+                </a:solidFill>
+                <a:latin typeface="+mn-lt"/>
+                <a:ea typeface="+mn-ea"/>
+                <a:cs typeface="+mn-cs"/>
+              </a:defRPr>
+            </a:lvl3pPr>
+            <a:lvl4pPr marL="1600200" indent="-228600" algn="l" defTabSz="457200" rtl="0" eaLnBrk="1" latinLnBrk="0" hangingPunct="1">
+              <a:spcBef>
+                <a:spcPct val="20000"/>
+              </a:spcBef>
+              <a:spcAft>
+                <a:spcPts val="600"/>
+              </a:spcAft>
+              <a:buClr>
+                <a:schemeClr val="accent1"/>
+              </a:buClr>
+              <a:buFont typeface="Wingdings 2" charset="2"/>
+              <a:buChar char=""/>
+              <a:defRPr sz="1200" kern="1200">
+                <a:solidFill>
+                  <a:schemeClr val="tx1"/>
+                </a:solidFill>
+                <a:latin typeface="+mn-lt"/>
+                <a:ea typeface="+mn-ea"/>
+                <a:cs typeface="+mn-cs"/>
+              </a:defRPr>
+            </a:lvl4pPr>
+            <a:lvl5pPr marL="2057400" indent="-228600" algn="l" defTabSz="457200" rtl="0" eaLnBrk="1" latinLnBrk="0" hangingPunct="1">
+              <a:spcBef>
+                <a:spcPct val="20000"/>
+              </a:spcBef>
+              <a:spcAft>
+                <a:spcPts val="600"/>
+              </a:spcAft>
+              <a:buClr>
+                <a:schemeClr val="accent1"/>
+              </a:buClr>
+              <a:buFont typeface="Wingdings 2" charset="2"/>
+              <a:buChar char=""/>
+              <a:defRPr sz="1200" kern="1200">
+                <a:solidFill>
+                  <a:schemeClr val="tx1"/>
+                </a:solidFill>
+                <a:latin typeface="+mn-lt"/>
+                <a:ea typeface="+mn-ea"/>
+                <a:cs typeface="+mn-cs"/>
+              </a:defRPr>
+            </a:lvl5pPr>
+            <a:lvl6pPr marL="2400000" indent="-228600" algn="l" defTabSz="457200" rtl="0" eaLnBrk="1" latinLnBrk="0" hangingPunct="1">
+              <a:spcBef>
+                <a:spcPct val="20000"/>
+              </a:spcBef>
+              <a:spcAft>
+                <a:spcPts val="600"/>
+              </a:spcAft>
+              <a:buClr>
+                <a:schemeClr val="accent1"/>
+              </a:buClr>
+              <a:buFont typeface="Wingdings 2" charset="2"/>
+              <a:buChar char=""/>
+              <a:defRPr sz="1200" kern="1200">
+                <a:solidFill>
+                  <a:schemeClr val="tx1"/>
+                </a:solidFill>
+                <a:latin typeface="+mn-lt"/>
+                <a:ea typeface="+mn-ea"/>
+                <a:cs typeface="+mn-cs"/>
+              </a:defRPr>
+            </a:lvl6pPr>
+            <a:lvl7pPr marL="2800000" indent="-228600" algn="l" defTabSz="457200" rtl="0" eaLnBrk="1" latinLnBrk="0" hangingPunct="1">
+              <a:spcBef>
+                <a:spcPct val="20000"/>
+              </a:spcBef>
+              <a:spcAft>
+                <a:spcPts val="600"/>
+              </a:spcAft>
+              <a:buClr>
+                <a:schemeClr val="accent1"/>
+              </a:buClr>
+              <a:buFont typeface="Wingdings 2" charset="2"/>
+              <a:buChar char=""/>
+              <a:defRPr sz="1200" kern="1200">
+                <a:solidFill>
+                  <a:schemeClr val="tx1"/>
+                </a:solidFill>
+                <a:latin typeface="+mn-lt"/>
+                <a:ea typeface="+mn-ea"/>
+                <a:cs typeface="+mn-cs"/>
+              </a:defRPr>
+            </a:lvl7pPr>
+            <a:lvl8pPr marL="3200000" indent="-228600" algn="l" defTabSz="457200" rtl="0" eaLnBrk="1" latinLnBrk="0" hangingPunct="1">
+              <a:spcBef>
+                <a:spcPct val="20000"/>
+              </a:spcBef>
+              <a:spcAft>
+                <a:spcPts val="600"/>
+              </a:spcAft>
+              <a:buClr>
+                <a:schemeClr val="accent1"/>
+              </a:buClr>
+              <a:buFont typeface="Wingdings 2" charset="2"/>
+              <a:buChar char=""/>
+              <a:defRPr sz="1200" kern="1200">
+                <a:solidFill>
+                  <a:schemeClr val="tx1"/>
+                </a:solidFill>
+                <a:latin typeface="+mn-lt"/>
+                <a:ea typeface="+mn-ea"/>
+                <a:cs typeface="+mn-cs"/>
+              </a:defRPr>
+            </a:lvl8pPr>
+            <a:lvl9pPr marL="3600000" indent="-228600" algn="l" defTabSz="457200" rtl="0" eaLnBrk="1" latinLnBrk="0" hangingPunct="1">
+              <a:spcBef>
+                <a:spcPct val="20000"/>
+              </a:spcBef>
+              <a:spcAft>
+                <a:spcPts val="600"/>
+              </a:spcAft>
+              <a:buClr>
+                <a:schemeClr val="accent1"/>
+              </a:buClr>
+              <a:buFont typeface="Wingdings 2" charset="2"/>
+              <a:buChar char=""/>
+              <a:defRPr sz="1200" kern="1200">
+                <a:solidFill>
+                  <a:schemeClr val="tx1"/>
+                </a:solidFill>
+                <a:latin typeface="+mn-lt"/>
+                <a:ea typeface="+mn-ea"/>
+                <a:cs typeface="+mn-cs"/>
+              </a:defRPr>
+            </a:lvl9pPr>
+          </a:lstStyle>
+          <a:p>
+            <a:r>
+              <a:rPr lang="en-US" sz="2000" dirty="0"/>
+              <a:t>Separating these into separate container or VM decouples them from the same run time and same instance</a:t>
+            </a:r>
+          </a:p>
+          <a:p>
+            <a:pPr lvl="1"/>
+            <a:r>
+              <a:rPr lang="en-US" sz="2000" dirty="0"/>
+              <a:t>Or, instead of one Hadoop cluster, run 3 smaller ones (</a:t>
+            </a:r>
+            <a:r>
+              <a:rPr lang="en-US" sz="2000" dirty="0" err="1"/>
+              <a:t>eg</a:t>
+            </a:r>
+            <a:r>
+              <a:rPr lang="en-US" sz="2000" dirty="0"/>
+              <a:t>: AWS EMR)</a:t>
+            </a:r>
+          </a:p>
+          <a:p>
+            <a:r>
+              <a:rPr lang="en-US" sz="2000" dirty="0"/>
+              <a:t>Now all the pieces can run independently (and use different frameworks if so desired)</a:t>
+            </a:r>
+          </a:p>
+          <a:p>
+            <a:r>
+              <a:rPr lang="en-US" sz="2000" dirty="0"/>
+              <a:t>It can run on one “pool” of machines, but the pieces are now separated</a:t>
+            </a:r>
+          </a:p>
+          <a:p>
+            <a:r>
+              <a:rPr lang="en-US" sz="2000" dirty="0"/>
+              <a:t>Advanced Data-Center OS type solutions make management of CPU, network and memory feasible </a:t>
+            </a:r>
+          </a:p>
+        </p:txBody>
+      </p:sp>
+    </p:spTree>
+    <p:extLst>
+      <p:ext uri="{BB962C8B-B14F-4D97-AF65-F5344CB8AC3E}">
+        <p14:creationId xmlns:p14="http://schemas.microsoft.com/office/powerpoint/2010/main" val="4148818733"/>
+      </p:ext>
+    </p:extLst>
+  </p:cSld>
+  <p:clrMapOvr>
+    <a:masterClrMapping/>
+  </p:clrMapOvr>
+</p:sld>
+</file>
+
+<file path=ppt/slides/slide18.xml><?xml version="1.0" encoding="utf-8"?>
+<p:sld xmlns:a="http://schemas.openxmlformats.org/drawingml/2006/main" xmlns:r="http://schemas.openxmlformats.org/officeDocument/2006/relationships" xmlns:p="http://schemas.openxmlformats.org/presentationml/2006/main">
+  <p:cSld>
+    <p:spTree>
+      <p:nvGrpSpPr>
+        <p:cNvPr id="1" name=""/>
+        <p:cNvGrpSpPr/>
+        <p:nvPr/>
+      </p:nvGrpSpPr>
+      <p:grpSpPr>
+        <a:xfrm>
+          <a:off x="0" y="0"/>
+          <a:ext cx="0" cy="0"/>
+          <a:chOff x="0" y="0"/>
+          <a:chExt cx="0" cy="0"/>
+        </a:xfrm>
+      </p:grpSpPr>
+      <p:sp>
+        <p:nvSpPr>
+          <p:cNvPr id="2" name="Title 1">
+            <a:extLst>
+              <a:ext uri="{FF2B5EF4-FFF2-40B4-BE49-F238E27FC236}">
+                <a16:creationId xmlns:a16="http://schemas.microsoft.com/office/drawing/2014/main" id="{0B8E87A0-5F87-4F9D-9483-22A88C6B58BC}"/>
+              </a:ext>
+            </a:extLst>
+          </p:cNvPr>
+          <p:cNvSpPr>
+            <a:spLocks noGrp="1"/>
+          </p:cNvSpPr>
+          <p:nvPr>
+            <p:ph type="title"/>
+          </p:nvPr>
+        </p:nvSpPr>
+        <p:spPr/>
+        <p:txBody>
+          <a:bodyPr/>
+          <a:lstStyle/>
+          <a:p>
+            <a:r>
+              <a:rPr lang="en-US" dirty="0"/>
+              <a:t>Thanks for your time-!</a:t>
+            </a:r>
+          </a:p>
+        </p:txBody>
+      </p:sp>
+      <p:sp>
+        <p:nvSpPr>
+          <p:cNvPr id="3" name="Content Placeholder 2">
+            <a:extLst>
+              <a:ext uri="{FF2B5EF4-FFF2-40B4-BE49-F238E27FC236}">
+                <a16:creationId xmlns:a16="http://schemas.microsoft.com/office/drawing/2014/main" id="{14AE5628-AFC6-4179-A60A-6E85420BCBD0}"/>
+              </a:ext>
+            </a:extLst>
+          </p:cNvPr>
+          <p:cNvSpPr>
+            <a:spLocks noGrp="1"/>
+          </p:cNvSpPr>
+          <p:nvPr>
+            <p:ph idx="1"/>
+          </p:nvPr>
+        </p:nvSpPr>
+        <p:spPr>
+          <a:xfrm>
+            <a:off x="818712" y="2222287"/>
+            <a:ext cx="10554574" cy="4403800"/>
+          </a:xfrm>
+        </p:spPr>
+        <p:txBody>
+          <a:bodyPr>
             <a:normAutofit/>
           </a:bodyPr>
           <a:lstStyle/>
+          <a:p>
+            <a:r>
+              <a:rPr lang="en-US" sz="2000" dirty="0"/>
+              <a:t>Questions?</a:t>
+            </a:r>
+          </a:p>
+          <a:p>
+            <a:r>
+              <a:rPr lang="en-US" sz="2000" dirty="0"/>
+              <a:t>Let’s talk more!</a:t>
+            </a:r>
+          </a:p>
+          <a:p>
+            <a:pPr lvl="1"/>
+            <a:r>
+              <a:rPr lang="en-US" sz="2000" dirty="0"/>
+              <a:t>Questions now, after the presentation or later on - as it is most comfortable for you</a:t>
+            </a:r>
+          </a:p>
+          <a:p>
+            <a:pPr lvl="1"/>
+            <a:r>
+              <a:rPr lang="en-US" sz="2000" dirty="0">
+                <a:hlinkClick r:id="rId2"/>
+              </a:rPr>
+              <a:t>bwolesa@gmail.com</a:t>
+            </a:r>
+            <a:r>
+              <a:rPr lang="en-US" sz="2000" dirty="0"/>
+              <a:t> </a:t>
+            </a:r>
+          </a:p>
           <a:p>
             <a:pPr marL="0" indent="0">
               <a:buNone/>
             </a:pPr>
-            <a:endParaRPr lang="en-US" dirty="0"/>
+            <a:endParaRPr lang="en-US" sz="2000" dirty="0"/>
+          </a:p>
+          <a:p>
+            <a:pPr marL="0" indent="0">
+              <a:buNone/>
+            </a:pPr>
+            <a:endParaRPr lang="en-US" sz="2000" dirty="0"/>
+          </a:p>
+          <a:p>
+            <a:pPr marL="0" indent="0">
+              <a:buNone/>
+            </a:pPr>
+            <a:r>
+              <a:rPr lang="en-US" sz="2000" dirty="0"/>
+              <a:t>Slides available on </a:t>
+            </a:r>
+            <a:r>
+              <a:rPr lang="en-US" sz="2000" dirty="0">
+                <a:hlinkClick r:id="rId3"/>
+              </a:rPr>
+              <a:t>https://github.com/bwehrle/Presentations</a:t>
+            </a:r>
+            <a:endParaRPr lang="en-US" sz="2000" dirty="0"/>
+          </a:p>
+          <a:p>
+            <a:pPr marL="0" indent="0">
+              <a:buNone/>
+            </a:pPr>
+            <a:endParaRPr lang="en-US" sz="2000" dirty="0"/>
           </a:p>
         </p:txBody>
       </p:sp>
@@ -6048,7 +6943,7 @@
               <a:buNone/>
             </a:pPr>
             <a:r>
-              <a:rPr lang="en-US" sz="2800" dirty="0"/>
+              <a:rPr lang="en-US" sz="3600" dirty="0"/>
               <a:t>Bio:</a:t>
             </a:r>
           </a:p>
@@ -6058,16 +6953,8 @@
               <a:buChar char="•"/>
             </a:pPr>
             <a:r>
-              <a:rPr lang="en-US" dirty="0"/>
-              <a:t>Been living in Catalonia for last 10 years (</a:t>
-            </a:r>
-            <a:r>
-              <a:rPr lang="en-US" dirty="0" err="1"/>
-              <a:t>Olesa</a:t>
-            </a:r>
-            <a:r>
-              <a:rPr lang="en-US" dirty="0"/>
-              <a:t> de Montserrat)</a:t>
+              <a:rPr lang="en-US" sz="1800" dirty="0"/>
+              <a:t>Software architect</a:t>
             </a:r>
           </a:p>
           <a:p>
@@ -6076,7 +6963,7 @@
               <a:buChar char="•"/>
             </a:pPr>
             <a:r>
-              <a:rPr lang="en-US" dirty="0"/>
+              <a:rPr lang="en-US" sz="1800" dirty="0"/>
               <a:t>Professional background in software development</a:t>
             </a:r>
           </a:p>
@@ -6086,8 +6973,16 @@
               <a:buChar char="•"/>
             </a:pPr>
             <a:r>
-              <a:rPr lang="en-US" dirty="0"/>
-              <a:t>Last 3 years spent working on big-data related projects</a:t>
+              <a:rPr lang="en-US" sz="1800" dirty="0"/>
+              <a:t>Been living in Catalonia for last 10 years (</a:t>
+            </a:r>
+            <a:r>
+              <a:rPr lang="en-US" sz="1800" dirty="0" err="1"/>
+              <a:t>Olesa</a:t>
+            </a:r>
+            <a:r>
+              <a:rPr lang="en-US" sz="1800" dirty="0"/>
+              <a:t> de Montserrat)</a:t>
             </a:r>
           </a:p>
           <a:p>
@@ -6096,7 +6991,17 @@
               <a:buChar char="•"/>
             </a:pPr>
             <a:r>
-              <a:rPr lang="en-US" dirty="0"/>
+              <a:rPr lang="en-US" sz="1800" dirty="0"/>
+              <a:t>Last 3 years spent working on big-data related projects</a:t>
+            </a:r>
+          </a:p>
+          <a:p>
+            <a:pPr lvl="2">
+              <a:buFont typeface="Arial" panose="020B0604020202020204" pitchFamily="34" charset="0"/>
+              <a:buChar char="•"/>
+            </a:pPr>
+            <a:r>
+              <a:rPr lang="en-US" sz="1800" dirty="0"/>
               <a:t>Companies I’ve worked for:</a:t>
             </a:r>
           </a:p>
@@ -6106,8 +7011,8 @@
               <a:buChar char="•"/>
             </a:pPr>
             <a:r>
-              <a:rPr lang="en-US" dirty="0"/>
-              <a:t>Vistaprint </a:t>
+              <a:rPr lang="en-US" sz="1600" dirty="0"/>
+              <a:t>Vistaprint (BCN)</a:t>
             </a:r>
           </a:p>
           <a:p>
@@ -6116,8 +7021,8 @@
               <a:buChar char="•"/>
             </a:pPr>
             <a:r>
-              <a:rPr lang="en-US" dirty="0"/>
-              <a:t>Xerox</a:t>
+              <a:rPr lang="en-US" sz="1600" dirty="0"/>
+              <a:t>Xerox (BCN)</a:t>
             </a:r>
           </a:p>
           <a:p>
@@ -6126,8 +7031,8 @@
               <a:buChar char="•"/>
             </a:pPr>
             <a:r>
-              <a:rPr lang="en-US" dirty="0"/>
-              <a:t>Microsoft</a:t>
+              <a:rPr lang="en-US" sz="1600" dirty="0"/>
+              <a:t>Microsoft (Redmond &amp; Dublin)</a:t>
             </a:r>
           </a:p>
           <a:p>
@@ -6135,7 +7040,7 @@
               <a:buFont typeface="Arial" panose="020B0604020202020204" pitchFamily="34" charset="0"/>
               <a:buChar char="•"/>
             </a:pPr>
-            <a:endParaRPr lang="en-US" dirty="0"/>
+            <a:endParaRPr lang="en-US" sz="2000" dirty="0"/>
           </a:p>
         </p:txBody>
       </p:sp>
@@ -6192,7 +7097,7 @@
           <a:p>
             <a:r>
               <a:rPr lang="en-US" dirty="0"/>
-              <a:t>Intro: Some recommendations</a:t>
+              <a:t>Presentation Overview</a:t>
             </a:r>
           </a:p>
         </p:txBody>
@@ -6221,73 +7126,80 @@
         </p:spPr>
         <p:txBody>
           <a:bodyPr>
-            <a:normAutofit/>
+            <a:noAutofit/>
           </a:bodyPr>
           <a:lstStyle/>
           <a:p>
             <a:r>
               <a:rPr lang="en-US" dirty="0"/>
-              <a:t>Data</a:t>
+              <a:t>Data : The foundation of everything</a:t>
             </a:r>
           </a:p>
           <a:p>
             <a:pPr lvl="1"/>
             <a:r>
+              <a:rPr lang="en-US" sz="1800" dirty="0"/>
+              <a:t>Events are the source data</a:t>
+            </a:r>
+          </a:p>
+          <a:p>
+            <a:pPr lvl="1"/>
+            <a:r>
+              <a:rPr lang="en-US" sz="1800" dirty="0"/>
+              <a:t>Copying mutable data is an anti-pattern</a:t>
+            </a:r>
+          </a:p>
+          <a:p>
+            <a:pPr lvl="1"/>
+            <a:r>
+              <a:rPr lang="en-US" sz="1800" dirty="0"/>
+              <a:t>Don’t make data an after thought</a:t>
+            </a:r>
+          </a:p>
+          <a:p>
+            <a:r>
               <a:rPr lang="en-US" dirty="0"/>
-              <a:t>Data vs Events</a:t>
+              <a:t>Storage : Where the data goes</a:t>
             </a:r>
           </a:p>
           <a:p>
             <a:pPr lvl="1"/>
             <a:r>
+              <a:rPr lang="en-US" sz="1800" dirty="0"/>
+              <a:t>Keep all the data you can afford</a:t>
+            </a:r>
+          </a:p>
+          <a:p>
+            <a:pPr lvl="1"/>
+            <a:r>
+              <a:rPr lang="en-US" sz="1800" dirty="0"/>
+              <a:t>Separate compute and storage and you can be more elastic</a:t>
+            </a:r>
+          </a:p>
+          <a:p>
+            <a:pPr lvl="1"/>
+            <a:r>
+              <a:rPr lang="en-US" sz="1800" dirty="0"/>
+              <a:t>Check out managed services</a:t>
+            </a:r>
+          </a:p>
+          <a:p>
+            <a:r>
               <a:rPr lang="en-US" dirty="0"/>
-              <a:t>Use events, not mutable source data</a:t>
-            </a:r>
-          </a:p>
-          <a:p>
-            <a:r>
-              <a:rPr lang="en-US" dirty="0"/>
-              <a:t>Storage</a:t>
+              <a:t>Processing : Transformation and computation</a:t>
             </a:r>
           </a:p>
           <a:p>
             <a:pPr lvl="1"/>
             <a:r>
-              <a:rPr lang="en-US" dirty="0"/>
-              <a:t>Keep all the data you can afford</a:t>
+              <a:rPr lang="en-US" sz="1800" dirty="0"/>
+              <a:t>Meta-data adds important logging into the system</a:t>
             </a:r>
           </a:p>
           <a:p>
             <a:pPr lvl="1"/>
             <a:r>
-              <a:rPr lang="en-US" dirty="0"/>
-              <a:t>Separate compute and storage and you can be more elastic</a:t>
-            </a:r>
-          </a:p>
-          <a:p>
-            <a:pPr lvl="1"/>
-            <a:r>
-              <a:rPr lang="en-US" dirty="0"/>
-              <a:t>Check out managed services</a:t>
-            </a:r>
-          </a:p>
-          <a:p>
-            <a:r>
-              <a:rPr lang="en-US" dirty="0"/>
-              <a:t>Processing</a:t>
-            </a:r>
-          </a:p>
-          <a:p>
-            <a:pPr lvl="1"/>
-            <a:r>
-              <a:rPr lang="en-US" dirty="0"/>
-              <a:t>Meta-data adds important logging into the system</a:t>
-            </a:r>
-          </a:p>
-          <a:p>
-            <a:pPr lvl="1"/>
-            <a:r>
-              <a:rPr lang="en-US" dirty="0"/>
+              <a:rPr lang="en-US" sz="1800" dirty="0"/>
               <a:t>Avoid monolithic system design</a:t>
             </a:r>
           </a:p>
@@ -6346,7 +7258,7 @@
           <a:p>
             <a:r>
               <a:rPr lang="en-US" dirty="0"/>
-              <a:t>The building block of all data is events</a:t>
+              <a:t>Data: Events are the intrinsic data that matters most</a:t>
             </a:r>
           </a:p>
         </p:txBody>
@@ -6367,62 +7279,67 @@
             <p:ph idx="1"/>
           </p:nvPr>
         </p:nvSpPr>
-        <p:spPr/>
+        <p:spPr>
+          <a:xfrm>
+            <a:off x="818712" y="2222287"/>
+            <a:ext cx="10554574" cy="4188525"/>
+          </a:xfrm>
+        </p:spPr>
         <p:txBody>
           <a:bodyPr>
-            <a:normAutofit/>
+            <a:noAutofit/>
           </a:bodyPr>
           <a:lstStyle/>
           <a:p>
             <a:r>
-              <a:rPr lang="en-US" dirty="0"/>
+              <a:rPr lang="en-US" sz="2000" dirty="0"/>
               <a:t>Data can be said to be just about anything that can be processed</a:t>
             </a:r>
           </a:p>
           <a:p>
             <a:r>
-              <a:rPr lang="en-US" dirty="0"/>
+              <a:rPr lang="en-US" sz="2000" dirty="0"/>
               <a:t>However, its vitally important to think about “events” as the building blocks of all data</a:t>
             </a:r>
           </a:p>
           <a:p>
             <a:r>
-              <a:rPr lang="en-US" dirty="0"/>
+              <a:rPr lang="en-US" sz="2000" dirty="0"/>
               <a:t>Events are:</a:t>
             </a:r>
           </a:p>
           <a:p>
             <a:pPr lvl="1"/>
             <a:r>
-              <a:rPr lang="en-US" dirty="0"/>
+              <a:rPr lang="en-US" sz="2000" dirty="0"/>
               <a:t>Unique</a:t>
             </a:r>
           </a:p>
           <a:p>
             <a:pPr lvl="1"/>
             <a:r>
-              <a:rPr lang="en-US" dirty="0"/>
-              <a:t>Contain Immutable information</a:t>
+              <a:rPr lang="en-US" sz="2000" dirty="0"/>
+              <a:t>Contain immutable information</a:t>
             </a:r>
           </a:p>
           <a:p>
             <a:pPr lvl="1"/>
             <a:r>
-              <a:rPr lang="en-US" dirty="0"/>
+              <a:rPr lang="en-US" sz="2000" dirty="0"/>
               <a:t>Orderable</a:t>
             </a:r>
           </a:p>
           <a:p>
             <a:r>
-              <a:rPr lang="en-US" dirty="0"/>
-              <a:t>From events all other data can be constructed</a:t>
+              <a:rPr lang="en-US" sz="2000" dirty="0"/>
+              <a:t>From events all other representations of the data can be constructed:</a:t>
             </a:r>
           </a:p>
           <a:p>
             <a:pPr lvl="1"/>
             <a:r>
-              <a:rPr lang="en-US" dirty="0"/>
-              <a:t>If you’re capturing data but not events, you’re going to have troubles</a:t>
+              <a:rPr lang="en-US" sz="2000" dirty="0"/>
+              <a:t>If you’re capturing data but not events, you at risk of missing data or having inaccurate data</a:t>
             </a:r>
           </a:p>
         </p:txBody>
@@ -6480,7 +7397,7 @@
           <a:p>
             <a:r>
               <a:rPr lang="en-US" dirty="0"/>
-              <a:t>Data anti-patterns: mutable source data</a:t>
+              <a:t>Data: Copying mutable data is an anti-pattern</a:t>
             </a:r>
           </a:p>
         </p:txBody>
@@ -6501,66 +7418,55 @@
             <p:ph idx="1"/>
           </p:nvPr>
         </p:nvSpPr>
-        <p:spPr/>
-        <p:txBody>
-          <a:bodyPr/>
-          <a:lstStyle/>
-          <a:p>
-            <a:r>
-              <a:rPr lang="en-US" dirty="0"/>
-              <a:t>Why anti-patterns?</a:t>
+        <p:spPr>
+          <a:xfrm>
+            <a:off x="818712" y="2222287"/>
+            <a:ext cx="10554574" cy="3953226"/>
+          </a:xfrm>
+        </p:spPr>
+        <p:txBody>
+          <a:bodyPr>
+            <a:normAutofit/>
+          </a:bodyPr>
+          <a:lstStyle/>
+          <a:p>
+            <a:r>
+              <a:rPr lang="en-US" sz="2000" dirty="0"/>
+              <a:t>Polling data from an upstream source</a:t>
             </a:r>
           </a:p>
           <a:p>
             <a:pPr lvl="1"/>
             <a:r>
-              <a:rPr lang="en-US" dirty="0"/>
-              <a:t>Because these lead to weaker systems and increased system complexities</a:t>
-            </a:r>
-          </a:p>
-          <a:p>
-            <a:r>
-              <a:rPr lang="en-US" dirty="0"/>
-              <a:t>Copying mutable data sources and “streaming” the data</a:t>
+              <a:rPr lang="en-US" sz="2000" dirty="0"/>
+              <a:t>Why? They only gave us a polling / pull interface (we don’t control the API)</a:t>
             </a:r>
           </a:p>
           <a:p>
             <a:pPr lvl="1"/>
             <a:r>
-              <a:rPr lang="en-US" dirty="0"/>
-              <a:t>Why? Because we can’t change the source system to send </a:t>
-            </a:r>
-            <a:r>
-              <a:rPr lang="en-US" dirty="0" err="1"/>
-              <a:t>egvents</a:t>
-            </a:r>
-            <a:endParaRPr lang="en-US" dirty="0"/>
+              <a:rPr lang="en-US" sz="2000" dirty="0"/>
+              <a:t>Problem: Data window underlap (classic batch data problem) and complexity</a:t>
+            </a:r>
+          </a:p>
+          <a:p>
+            <a:r>
+              <a:rPr lang="en-US" sz="2200" dirty="0"/>
+              <a:t>Copying data in batches from upstream database</a:t>
+            </a:r>
           </a:p>
           <a:p>
             <a:pPr lvl="1"/>
             <a:r>
-              <a:rPr lang="en-US" dirty="0"/>
-              <a:t>Problem: Not scalable and not an accurate view of the entire system</a:t>
-            </a:r>
-          </a:p>
-          <a:p>
-            <a:r>
-              <a:rPr lang="en-US" dirty="0"/>
-              <a:t>Polling data from an upstream source:</a:t>
+              <a:rPr lang="en-US" sz="2000" dirty="0"/>
+              <a:t>Why? They only gave us access to a reporting database</a:t>
             </a:r>
           </a:p>
           <a:p>
             <a:pPr lvl="1"/>
             <a:r>
-              <a:rPr lang="en-US" dirty="0"/>
-              <a:t>Why? They only gave us a polling / pull interface (we don’t control the API)</a:t>
-            </a:r>
-          </a:p>
-          <a:p>
-            <a:pPr lvl="1"/>
-            <a:r>
-              <a:rPr lang="en-US" dirty="0"/>
-              <a:t>Problem: Complexity of a complete solution and data window underlap (classic batch data problem)</a:t>
+              <a:rPr lang="en-US" sz="2000" dirty="0"/>
+              <a:t>Problem: Same as above; it also can make elastic processing bound on non-scalable relational DB.</a:t>
             </a:r>
           </a:p>
         </p:txBody>
@@ -6618,7 +7524,7 @@
           <a:p>
             <a:r>
               <a:rPr lang="en-US" dirty="0"/>
-              <a:t>E-commerce basket data example:</a:t>
+              <a:t>Data: Event data example with baskets</a:t>
             </a:r>
           </a:p>
         </p:txBody>
@@ -6639,55 +7545,61 @@
             <p:ph idx="1"/>
           </p:nvPr>
         </p:nvSpPr>
-        <p:spPr/>
-        <p:txBody>
-          <a:bodyPr/>
-          <a:lstStyle/>
-          <a:p>
-            <a:r>
-              <a:rPr lang="en-US" dirty="0"/>
-              <a:t>Imagine a basket in your e-commerce application</a:t>
+        <p:spPr>
+          <a:xfrm>
+            <a:off x="672938" y="2345635"/>
+            <a:ext cx="10554574" cy="3857719"/>
+          </a:xfrm>
+        </p:spPr>
+        <p:txBody>
+          <a:bodyPr>
+            <a:noAutofit/>
+          </a:bodyPr>
+          <a:lstStyle/>
+          <a:p>
+            <a:r>
+              <a:rPr lang="en-US" sz="2000" dirty="0"/>
+              <a:t>Imagine you have a “shopping basket” in your e-commerce application</a:t>
             </a:r>
           </a:p>
           <a:p>
             <a:pPr lvl="1"/>
             <a:r>
-              <a:rPr lang="en-US" dirty="0"/>
+              <a:rPr lang="en-US" sz="2000" dirty="0"/>
               <a:t>Each user has a basket that contains the products they are intending to buy (before checkout)</a:t>
             </a:r>
           </a:p>
           <a:p>
             <a:pPr lvl="1"/>
             <a:r>
-              <a:rPr lang="en-US" dirty="0"/>
-              <a:t>If I have a data stream I could:</a:t>
+              <a:rPr lang="en-US" sz="2000" dirty="0"/>
+              <a:t>My two options to get at this data stream are:</a:t>
             </a:r>
           </a:p>
           <a:p>
             <a:pPr lvl="2"/>
             <a:r>
-              <a:rPr lang="en-US" dirty="0"/>
-              <a:t>Poll each basket for each active user on a given frequency</a:t>
+              <a:rPr lang="en-US" sz="2000" dirty="0"/>
+              <a:t>Poll all/certain  baskets on a given frequency</a:t>
             </a:r>
           </a:p>
           <a:p>
             <a:pPr lvl="2"/>
             <a:r>
-              <a:rPr lang="en-US" dirty="0"/>
-              <a:t>Get a basket update event from the system every time a basket changes (add/remove)</a:t>
+              <a:rPr lang="en-US" sz="2000" dirty="0"/>
+              <a:t>Get a basket update event from the system every time a basket changes (add/remove) that includes what drove the change and what the change was (add/remove)</a:t>
             </a:r>
           </a:p>
           <a:p>
             <a:pPr lvl="1"/>
             <a:r>
-              <a:rPr lang="en-US" dirty="0"/>
+              <a:rPr lang="en-US" sz="2000" dirty="0"/>
               <a:t>Which is more tenable and scalable?</a:t>
             </a:r>
           </a:p>
           <a:p>
-            <a:pPr lvl="1"/>
-            <a:r>
-              <a:rPr lang="en-US" dirty="0"/>
+            <a:r>
+              <a:rPr lang="en-US" sz="2200" dirty="0"/>
               <a:t>Proper organizational structure can overcome barriers to the right solution</a:t>
             </a:r>
           </a:p>
@@ -6746,7 +7658,7 @@
           <a:p>
             <a:r>
               <a:rPr lang="en-US" dirty="0"/>
-              <a:t>Don’t make data an afterthought</a:t>
+              <a:t>Data: Don’t make data an afterthought</a:t>
             </a:r>
           </a:p>
         </p:txBody>
@@ -6775,55 +7687,48 @@
           <a:lstStyle/>
           <a:p>
             <a:r>
-              <a:rPr lang="en-US" dirty="0"/>
+              <a:rPr lang="en-US" sz="2000" dirty="0"/>
               <a:t>Systems development usually starts focusing around the functional aspects:</a:t>
             </a:r>
           </a:p>
           <a:p>
             <a:pPr lvl="1"/>
             <a:r>
-              <a:rPr lang="en-US" dirty="0"/>
+              <a:rPr lang="en-US" sz="2000" dirty="0"/>
               <a:t>Front/back end systems providing user features</a:t>
             </a:r>
           </a:p>
           <a:p>
             <a:pPr lvl="1"/>
             <a:r>
-              <a:rPr lang="en-US" dirty="0"/>
+              <a:rPr lang="en-US" sz="2000" dirty="0"/>
               <a:t>System design</a:t>
             </a:r>
           </a:p>
           <a:p>
             <a:r>
-              <a:rPr lang="en-US" dirty="0"/>
+              <a:rPr lang="en-US" sz="2000" dirty="0"/>
               <a:t>But data is showing to be one of the most important aspects of the modern eco-system</a:t>
             </a:r>
           </a:p>
           <a:p>
             <a:pPr lvl="1"/>
             <a:r>
-              <a:rPr lang="en-US" dirty="0"/>
+              <a:rPr lang="en-US" sz="2000" dirty="0"/>
               <a:t>Predictive systems</a:t>
             </a:r>
           </a:p>
           <a:p>
             <a:pPr lvl="1"/>
             <a:r>
-              <a:rPr lang="en-US" dirty="0"/>
+              <a:rPr lang="en-US" sz="2000" dirty="0"/>
               <a:t>Business intelligence</a:t>
             </a:r>
           </a:p>
           <a:p>
             <a:r>
-              <a:rPr lang="en-US" dirty="0"/>
-              <a:t>Adding this aspect at the end is not optimal</a:t>
-            </a:r>
-          </a:p>
-          <a:p>
-            <a:pPr lvl="1"/>
-            <a:r>
-              <a:rPr lang="en-US" dirty="0"/>
-              <a:t>There are many ways of leveraging events to isolate and validate the system, and using immutable data patterns actually makes simpler and more resilient software</a:t>
+              <a:rPr lang="en-US" sz="2000" dirty="0"/>
+              <a:t>Start to think about analytics and data use cases early in system design</a:t>
             </a:r>
           </a:p>
         </p:txBody>
@@ -6902,34 +7807,55 @@
             <p:ph idx="1"/>
           </p:nvPr>
         </p:nvSpPr>
-        <p:spPr/>
-        <p:txBody>
-          <a:bodyPr/>
-          <a:lstStyle/>
-          <a:p>
-            <a:r>
-              <a:rPr lang="en-US" dirty="0"/>
-              <a:t>If you store data on the same systems you process data you’re binding the two together</a:t>
-            </a:r>
-          </a:p>
-          <a:p>
-            <a:r>
-              <a:rPr lang="en-US" dirty="0"/>
+        <p:spPr>
+          <a:xfrm>
+            <a:off x="818712" y="2222287"/>
+            <a:ext cx="10554574" cy="4297783"/>
+          </a:xfrm>
+        </p:spPr>
+        <p:txBody>
+          <a:bodyPr>
+            <a:normAutofit/>
+          </a:bodyPr>
+          <a:lstStyle/>
+          <a:p>
+            <a:r>
+              <a:rPr lang="en-US" sz="2000" dirty="0"/>
               <a:t>Data and processing capacity generally need to be elastic</a:t>
             </a:r>
           </a:p>
           <a:p>
-            <a:pPr lvl="2"/>
-            <a:r>
-              <a:rPr lang="en-US" dirty="0"/>
-              <a:t>But you can’t scale down compute if your data is on the same nodes</a:t>
-            </a:r>
-          </a:p>
-          <a:p>
-            <a:pPr lvl="2"/>
-            <a:r>
-              <a:rPr lang="en-US" dirty="0"/>
-              <a:t>The cost of compute is much higher than that of block storage, so you might end up with lots of wasted capacity</a:t>
+            <a:pPr lvl="1"/>
+            <a:r>
+              <a:rPr lang="en-US" sz="2000" dirty="0"/>
+              <a:t>But you can’t scale down CPU-underutilized node if your data is on those same instances</a:t>
+            </a:r>
+          </a:p>
+          <a:p>
+            <a:pPr lvl="1"/>
+            <a:r>
+              <a:rPr lang="en-US" sz="2000" dirty="0"/>
+              <a:t>If we are limited to computing where our data is, many jobs can collide for a limited set of nodes.</a:t>
+            </a:r>
+          </a:p>
+          <a:p>
+            <a:r>
+              <a:rPr lang="en-US" sz="2000" dirty="0"/>
+              <a:t>Compute and storage on the same machine is an artifact from Hadoop systems, where HDFS is used to communicate results of MapReduce stages</a:t>
+            </a:r>
+          </a:p>
+          <a:p>
+            <a:pPr lvl="1"/>
+            <a:r>
+              <a:rPr lang="en-US" sz="2000" dirty="0"/>
+              <a:t>Newer systems not dependent on a DFS (example: Spark RDD) </a:t>
+            </a:r>
+          </a:p>
+          <a:p>
+            <a:pPr lvl="1"/>
+            <a:r>
+              <a:rPr lang="en-US" sz="2000" dirty="0"/>
+              <a:t>In case you’re using Hadoop, consider if you can start migrating</a:t>
             </a:r>
           </a:p>
         </p:txBody>
@@ -7008,41 +7934,61 @@
             <p:ph idx="1"/>
           </p:nvPr>
         </p:nvSpPr>
-        <p:spPr/>
-        <p:txBody>
-          <a:bodyPr/>
-          <a:lstStyle/>
-          <a:p>
-            <a:r>
-              <a:rPr lang="en-US" dirty="0"/>
+        <p:spPr>
+          <a:xfrm>
+            <a:off x="818712" y="2222287"/>
+            <a:ext cx="10554574" cy="4364043"/>
+          </a:xfrm>
+        </p:spPr>
+        <p:txBody>
+          <a:bodyPr>
+            <a:noAutofit/>
+          </a:bodyPr>
+          <a:lstStyle/>
+          <a:p>
+            <a:r>
+              <a:rPr lang="en-US" sz="2000" dirty="0"/>
               <a:t>Design for independent scalability of the system dependencies and de-couple</a:t>
             </a:r>
           </a:p>
           <a:p>
             <a:pPr lvl="1"/>
             <a:r>
-              <a:rPr lang="en-US" dirty="0"/>
+              <a:rPr lang="en-US" sz="2000" dirty="0"/>
               <a:t>Look at managed services (S3 vs HDFS)</a:t>
             </a:r>
           </a:p>
           <a:p>
             <a:r>
-              <a:rPr lang="en-US" dirty="0"/>
-              <a:t>The costs might be higher for managed services, but the flexibility and complexity of the system are really compelling especially for small teams</a:t>
+              <a:rPr lang="en-US" sz="2000" dirty="0"/>
+              <a:t>The costs might be higher for managed services, but the flexibility and complexity of the system are really compelling especially for small teams:</a:t>
             </a:r>
           </a:p>
           <a:p>
             <a:pPr lvl="1"/>
             <a:r>
-              <a:rPr lang="en-US" dirty="0"/>
+              <a:rPr lang="en-US" sz="2000" dirty="0"/>
               <a:t>You might have to sacrifice some platform neutrality, but it might be worth it!</a:t>
             </a:r>
           </a:p>
           <a:p>
             <a:pPr lvl="1"/>
             <a:r>
-              <a:rPr lang="en-US" dirty="0"/>
-              <a:t>Building a 99.999 up-time system for block storage that is globally replicated is going to cost you more that AWS</a:t>
+              <a:rPr lang="en-US" sz="2000" dirty="0"/>
+              <a:t>Building a 99.999 up-time system for block storage that is globally replicated is going to cost you more than what it will cost at AWS or Google</a:t>
+            </a:r>
+          </a:p>
+          <a:p>
+            <a:r>
+              <a:rPr lang="en-US" sz="2000" dirty="0"/>
+              <a:t>Focus on the systems that make a differentiate impact to your product’s performance:</a:t>
+            </a:r>
+          </a:p>
+          <a:p>
+            <a:pPr lvl="1"/>
+            <a:r>
+              <a:rPr lang="en-US" sz="2000" dirty="0"/>
+              <a:t>Dynamo too slow to do real-time product recommendations?, run your own Cassandra/HBase/… cluster</a:t>
             </a:r>
           </a:p>
         </p:txBody>

</xml_diff>